<commit_message>
Updated README with program run instructions
</commit_message>
<xml_diff>
--- a/architecture design decision.pptx
+++ b/architecture design decision.pptx
@@ -6,7 +6,9 @@
   </p:sldMasterIdLst>
   <p:sldIdLst>
     <p:sldId id="256" r:id="rId2"/>
-    <p:sldId id="257" r:id="rId3"/>
+    <p:sldId id="259" r:id="rId3"/>
+    <p:sldId id="258" r:id="rId4"/>
+    <p:sldId id="257" r:id="rId5"/>
   </p:sldIdLst>
   <p:sldSz cx="12192000" cy="6858000"/>
   <p:notesSz cx="6858000" cy="9144000"/>
@@ -105,6 +107,11 @@
       </a:defRPr>
     </a:lvl9pPr>
   </p:defaultTextStyle>
+  <p:extLst>
+    <p:ext uri="{EFAFB233-063F-42B5-8137-9DF3F51BA10A}">
+      <p15:sldGuideLst xmlns:p15="http://schemas.microsoft.com/office/powerpoint/2012/main"/>
+    </p:ext>
+  </p:extLst>
 </p:presentation>
 </file>
 
@@ -255,7 +262,7 @@
           <a:p>
             <a:fld id="{2BB0834A-BB5E-43E0-B5AB-F925B9CEEEC8}" type="datetimeFigureOut">
               <a:rPr lang="en-US" smtClean="0"/>
-              <a:t>9/30/2025</a:t>
+              <a:t>10/1/2025</a:t>
             </a:fld>
             <a:endParaRPr lang="en-US"/>
           </a:p>
@@ -453,7 +460,7 @@
           <a:p>
             <a:fld id="{2BB0834A-BB5E-43E0-B5AB-F925B9CEEEC8}" type="datetimeFigureOut">
               <a:rPr lang="en-US" smtClean="0"/>
-              <a:t>9/30/2025</a:t>
+              <a:t>10/1/2025</a:t>
             </a:fld>
             <a:endParaRPr lang="en-US"/>
           </a:p>
@@ -661,7 +668,7 @@
           <a:p>
             <a:fld id="{2BB0834A-BB5E-43E0-B5AB-F925B9CEEEC8}" type="datetimeFigureOut">
               <a:rPr lang="en-US" smtClean="0"/>
-              <a:t>9/30/2025</a:t>
+              <a:t>10/1/2025</a:t>
             </a:fld>
             <a:endParaRPr lang="en-US"/>
           </a:p>
@@ -859,7 +866,7 @@
           <a:p>
             <a:fld id="{2BB0834A-BB5E-43E0-B5AB-F925B9CEEEC8}" type="datetimeFigureOut">
               <a:rPr lang="en-US" smtClean="0"/>
-              <a:t>9/30/2025</a:t>
+              <a:t>10/1/2025</a:t>
             </a:fld>
             <a:endParaRPr lang="en-US"/>
           </a:p>
@@ -1134,7 +1141,7 @@
           <a:p>
             <a:fld id="{2BB0834A-BB5E-43E0-B5AB-F925B9CEEEC8}" type="datetimeFigureOut">
               <a:rPr lang="en-US" smtClean="0"/>
-              <a:t>9/30/2025</a:t>
+              <a:t>10/1/2025</a:t>
             </a:fld>
             <a:endParaRPr lang="en-US"/>
           </a:p>
@@ -1399,7 +1406,7 @@
           <a:p>
             <a:fld id="{2BB0834A-BB5E-43E0-B5AB-F925B9CEEEC8}" type="datetimeFigureOut">
               <a:rPr lang="en-US" smtClean="0"/>
-              <a:t>9/30/2025</a:t>
+              <a:t>10/1/2025</a:t>
             </a:fld>
             <a:endParaRPr lang="en-US"/>
           </a:p>
@@ -1811,7 +1818,7 @@
           <a:p>
             <a:fld id="{2BB0834A-BB5E-43E0-B5AB-F925B9CEEEC8}" type="datetimeFigureOut">
               <a:rPr lang="en-US" smtClean="0"/>
-              <a:t>9/30/2025</a:t>
+              <a:t>10/1/2025</a:t>
             </a:fld>
             <a:endParaRPr lang="en-US"/>
           </a:p>
@@ -1952,7 +1959,7 @@
           <a:p>
             <a:fld id="{2BB0834A-BB5E-43E0-B5AB-F925B9CEEEC8}" type="datetimeFigureOut">
               <a:rPr lang="en-US" smtClean="0"/>
-              <a:t>9/30/2025</a:t>
+              <a:t>10/1/2025</a:t>
             </a:fld>
             <a:endParaRPr lang="en-US"/>
           </a:p>
@@ -2065,7 +2072,7 @@
           <a:p>
             <a:fld id="{2BB0834A-BB5E-43E0-B5AB-F925B9CEEEC8}" type="datetimeFigureOut">
               <a:rPr lang="en-US" smtClean="0"/>
-              <a:t>9/30/2025</a:t>
+              <a:t>10/1/2025</a:t>
             </a:fld>
             <a:endParaRPr lang="en-US"/>
           </a:p>
@@ -2376,7 +2383,7 @@
           <a:p>
             <a:fld id="{2BB0834A-BB5E-43E0-B5AB-F925B9CEEEC8}" type="datetimeFigureOut">
               <a:rPr lang="en-US" smtClean="0"/>
-              <a:t>9/30/2025</a:t>
+              <a:t>10/1/2025</a:t>
             </a:fld>
             <a:endParaRPr lang="en-US"/>
           </a:p>
@@ -2667,7 +2674,7 @@
           <a:p>
             <a:fld id="{2BB0834A-BB5E-43E0-B5AB-F925B9CEEEC8}" type="datetimeFigureOut">
               <a:rPr lang="en-US" smtClean="0"/>
-              <a:t>9/30/2025</a:t>
+              <a:t>10/1/2025</a:t>
             </a:fld>
             <a:endParaRPr lang="en-US"/>
           </a:p>
@@ -2908,7 +2915,7 @@
           <a:p>
             <a:fld id="{2BB0834A-BB5E-43E0-B5AB-F925B9CEEEC8}" type="datetimeFigureOut">
               <a:rPr lang="en-US" smtClean="0"/>
-              <a:t>9/30/2025</a:t>
+              <a:t>10/1/2025</a:t>
             </a:fld>
             <a:endParaRPr lang="en-US"/>
           </a:p>
@@ -3346,7 +3353,10 @@
           <a:bodyPr/>
           <a:lstStyle/>
           <a:p>
-            <a:endParaRPr lang="en-US" dirty="0"/>
+            <a:r>
+              <a:rPr lang="en-US" dirty="0"/>
+              <a:t>UAV Deconfliction</a:t>
+            </a:r>
           </a:p>
         </p:txBody>
       </p:sp>
@@ -3371,7 +3381,10 @@
           <a:bodyPr/>
           <a:lstStyle/>
           <a:p>
-            <a:endParaRPr lang="en-US"/>
+            <a:r>
+              <a:rPr lang="en-US" dirty="0"/>
+              <a:t>Design decision</a:t>
+            </a:r>
           </a:p>
         </p:txBody>
       </p:sp>
@@ -3389,6 +3402,780 @@
 </file>
 
 <file path=ppt/slides/slide2.xml><?xml version="1.0" encoding="utf-8"?>
+<p:sld xmlns:a="http://schemas.openxmlformats.org/drawingml/2006/main" xmlns:r="http://schemas.openxmlformats.org/officeDocument/2006/relationships" xmlns:p="http://schemas.openxmlformats.org/presentationml/2006/main">
+  <p:cSld>
+    <p:spTree>
+      <p:nvGrpSpPr>
+        <p:cNvPr id="1" name=""/>
+        <p:cNvGrpSpPr/>
+        <p:nvPr/>
+      </p:nvGrpSpPr>
+      <p:grpSpPr>
+        <a:xfrm>
+          <a:off x="0" y="0"/>
+          <a:ext cx="0" cy="0"/>
+          <a:chOff x="0" y="0"/>
+          <a:chExt cx="0" cy="0"/>
+        </a:xfrm>
+      </p:grpSpPr>
+      <p:sp>
+        <p:nvSpPr>
+          <p:cNvPr id="2" name="TextBox 1">
+            <a:extLst>
+              <a:ext uri="{FF2B5EF4-FFF2-40B4-BE49-F238E27FC236}">
+                <a16:creationId xmlns:a16="http://schemas.microsoft.com/office/drawing/2014/main" id="{C1D5F449-4562-0743-C8BF-5E3DBCEAE1EC}"/>
+              </a:ext>
+            </a:extLst>
+          </p:cNvPr>
+          <p:cNvSpPr txBox="1"/>
+          <p:nvPr/>
+        </p:nvSpPr>
+        <p:spPr>
+          <a:xfrm>
+            <a:off x="1043940" y="1287780"/>
+            <a:ext cx="8717280" cy="3539430"/>
+          </a:xfrm>
+          <a:prstGeom prst="rect">
+            <a:avLst/>
+          </a:prstGeom>
+          <a:noFill/>
+        </p:spPr>
+        <p:txBody>
+          <a:bodyPr wrap="square" rtlCol="0">
+            <a:spAutoFit/>
+          </a:bodyPr>
+          <a:lstStyle/>
+          <a:p>
+            <a:r>
+              <a:rPr lang="en-US" sz="1400" b="1" dirty="0"/>
+              <a:t>## Project Structure</a:t>
+            </a:r>
+          </a:p>
+          <a:p>
+            <a:pPr marL="285750" indent="-285750">
+              <a:buFont typeface="Arial" panose="020B0604020202020204" pitchFamily="34" charset="0"/>
+              <a:buChar char="•"/>
+            </a:pPr>
+            <a:br>
+              <a:rPr lang="en-US" sz="1400" dirty="0"/>
+            </a:br>
+            <a:r>
+              <a:rPr lang="en-US" sz="1400" dirty="0"/>
+              <a:t>config</a:t>
+            </a:r>
+          </a:p>
+          <a:p>
+            <a:pPr marL="742950" lvl="1" indent="-285750">
+              <a:buFont typeface="Arial" panose="020B0604020202020204" pitchFamily="34" charset="0"/>
+              <a:buChar char="•"/>
+            </a:pPr>
+            <a:r>
+              <a:rPr lang="en-US" sz="1400" dirty="0"/>
+              <a:t>config.py – Configuration parameters for UAVs and simulation.</a:t>
+            </a:r>
+          </a:p>
+          <a:p>
+            <a:pPr marL="285750" indent="-285750">
+              <a:buFont typeface="Arial" panose="020B0604020202020204" pitchFamily="34" charset="0"/>
+              <a:buChar char="•"/>
+            </a:pPr>
+            <a:r>
+              <a:rPr lang="en-US" sz="1400" dirty="0" err="1"/>
+              <a:t>src</a:t>
+            </a:r>
+            <a:r>
+              <a:rPr lang="en-US" sz="1400" dirty="0"/>
+              <a:t>  </a:t>
+            </a:r>
+          </a:p>
+          <a:p>
+            <a:pPr marL="742950" lvl="1" indent="-285750">
+              <a:buFont typeface="Arial" panose="020B0604020202020204" pitchFamily="34" charset="0"/>
+              <a:buChar char="•"/>
+            </a:pPr>
+            <a:r>
+              <a:rPr lang="en-US" sz="1400" dirty="0"/>
+              <a:t>main.py – Main entry point for the UAV deconfliction system.</a:t>
+            </a:r>
+          </a:p>
+          <a:p>
+            <a:pPr marL="742950" lvl="1" indent="-285750">
+              <a:buFont typeface="Arial" panose="020B0604020202020204" pitchFamily="34" charset="0"/>
+              <a:buChar char="•"/>
+            </a:pPr>
+            <a:r>
+              <a:rPr lang="en-US" sz="1400" dirty="0"/>
+              <a:t>collision_detection.py – Collision detection logic and utilities.</a:t>
+            </a:r>
+          </a:p>
+          <a:p>
+            <a:pPr marL="742950" lvl="1" indent="-285750">
+              <a:buFont typeface="Arial" panose="020B0604020202020204" pitchFamily="34" charset="0"/>
+              <a:buChar char="•"/>
+            </a:pPr>
+            <a:r>
+              <a:rPr lang="en-US" sz="1400" dirty="0"/>
+              <a:t>handle_input_data.py  – Handles input data for primary UAV.</a:t>
+            </a:r>
+          </a:p>
+          <a:p>
+            <a:pPr marL="742950" lvl="1" indent="-285750">
+              <a:buFont typeface="Arial" panose="020B0604020202020204" pitchFamily="34" charset="0"/>
+              <a:buChar char="•"/>
+            </a:pPr>
+            <a:r>
+              <a:rPr lang="en-US" sz="1400" dirty="0"/>
+              <a:t>simulationUavDB.py  – Simulation UAV data definitions.</a:t>
+            </a:r>
+          </a:p>
+          <a:p>
+            <a:pPr marL="742950" lvl="1" indent="-285750">
+              <a:buFont typeface="Arial" panose="020B0604020202020204" pitchFamily="34" charset="0"/>
+              <a:buChar char="•"/>
+            </a:pPr>
+            <a:r>
+              <a:rPr lang="en-US" sz="1400" dirty="0"/>
+              <a:t>waypoint_plot.py  – 3D plotting of UAV paths.</a:t>
+            </a:r>
+          </a:p>
+          <a:p>
+            <a:pPr marL="285750" indent="-285750">
+              <a:buFont typeface="Arial" panose="020B0604020202020204" pitchFamily="34" charset="0"/>
+              <a:buChar char="•"/>
+            </a:pPr>
+            <a:r>
+              <a:rPr lang="en-US" sz="1400" dirty="0" err="1"/>
+              <a:t>uav_info</a:t>
+            </a:r>
+            <a:r>
+              <a:rPr lang="en-US" sz="1400" err="1"/>
+              <a:t>_</a:t>
+            </a:r>
+            <a:r>
+              <a:rPr lang="en-US" sz="1400"/>
+              <a:t>def</a:t>
+            </a:r>
+            <a:endParaRPr lang="en-US" sz="1400" dirty="0"/>
+          </a:p>
+          <a:p>
+            <a:pPr marL="742950" lvl="1" indent="-285750">
+              <a:buFont typeface="Arial" panose="020B0604020202020204" pitchFamily="34" charset="0"/>
+              <a:buChar char="•"/>
+            </a:pPr>
+            <a:r>
+              <a:rPr lang="en-US" sz="1400" dirty="0"/>
+              <a:t>__init__.py – Package initializer for UAV info definitions.</a:t>
+            </a:r>
+          </a:p>
+          <a:p>
+            <a:pPr marL="742950" lvl="1" indent="-285750">
+              <a:buFont typeface="Arial" panose="020B0604020202020204" pitchFamily="34" charset="0"/>
+              <a:buChar char="•"/>
+            </a:pPr>
+            <a:r>
+              <a:rPr lang="en-US" sz="1400" dirty="0"/>
+              <a:t>uav_info.py – UAV data structures (position, time window, etc.).</a:t>
+            </a:r>
+          </a:p>
+          <a:p>
+            <a:pPr marL="285750" indent="-285750">
+              <a:buFont typeface="Arial" panose="020B0604020202020204" pitchFamily="34" charset="0"/>
+              <a:buChar char="•"/>
+            </a:pPr>
+            <a:r>
+              <a:rPr lang="en-US" sz="1400" dirty="0"/>
+              <a:t>test </a:t>
+            </a:r>
+          </a:p>
+          <a:p>
+            <a:pPr marL="742950" lvl="1" indent="-285750">
+              <a:buFont typeface="Arial" panose="020B0604020202020204" pitchFamily="34" charset="0"/>
+              <a:buChar char="•"/>
+            </a:pPr>
+            <a:r>
+              <a:rPr lang="en-US" sz="1400" dirty="0"/>
+              <a:t>test_main.py – Unit tests for main functionality.</a:t>
+            </a:r>
+          </a:p>
+          <a:p>
+            <a:endParaRPr lang="en-US" sz="1400" dirty="0"/>
+          </a:p>
+        </p:txBody>
+      </p:sp>
+    </p:spTree>
+    <p:extLst>
+      <p:ext uri="{BB962C8B-B14F-4D97-AF65-F5344CB8AC3E}">
+        <p14:creationId xmlns:p14="http://schemas.microsoft.com/office/powerpoint/2010/main" val="425895573"/>
+      </p:ext>
+    </p:extLst>
+  </p:cSld>
+  <p:clrMapOvr>
+    <a:masterClrMapping/>
+  </p:clrMapOvr>
+</p:sld>
+</file>
+
+<file path=ppt/slides/slide3.xml><?xml version="1.0" encoding="utf-8"?>
+<p:sld xmlns:a="http://schemas.openxmlformats.org/drawingml/2006/main" xmlns:r="http://schemas.openxmlformats.org/officeDocument/2006/relationships" xmlns:p="http://schemas.openxmlformats.org/presentationml/2006/main">
+  <p:cSld>
+    <p:spTree>
+      <p:nvGrpSpPr>
+        <p:cNvPr id="1" name=""/>
+        <p:cNvGrpSpPr/>
+        <p:nvPr/>
+      </p:nvGrpSpPr>
+      <p:grpSpPr>
+        <a:xfrm>
+          <a:off x="0" y="0"/>
+          <a:ext cx="0" cy="0"/>
+          <a:chOff x="0" y="0"/>
+          <a:chExt cx="0" cy="0"/>
+        </a:xfrm>
+      </p:grpSpPr>
+      <p:sp>
+        <p:nvSpPr>
+          <p:cNvPr id="2" name="TextBox 1">
+            <a:extLst>
+              <a:ext uri="{FF2B5EF4-FFF2-40B4-BE49-F238E27FC236}">
+                <a16:creationId xmlns:a16="http://schemas.microsoft.com/office/drawing/2014/main" id="{D11C3696-7E38-265E-A625-56E958718D7B}"/>
+              </a:ext>
+            </a:extLst>
+          </p:cNvPr>
+          <p:cNvSpPr txBox="1"/>
+          <p:nvPr/>
+        </p:nvSpPr>
+        <p:spPr>
+          <a:xfrm>
+            <a:off x="618008" y="428822"/>
+            <a:ext cx="3890930" cy="369332"/>
+          </a:xfrm>
+          <a:prstGeom prst="rect">
+            <a:avLst/>
+          </a:prstGeom>
+          <a:noFill/>
+        </p:spPr>
+        <p:txBody>
+          <a:bodyPr wrap="square" rtlCol="0">
+            <a:spAutoFit/>
+          </a:bodyPr>
+          <a:lstStyle/>
+          <a:p>
+            <a:r>
+              <a:rPr lang="en-US" dirty="0"/>
+              <a:t>Control flow</a:t>
+            </a:r>
+          </a:p>
+        </p:txBody>
+      </p:sp>
+      <p:sp>
+        <p:nvSpPr>
+          <p:cNvPr id="3" name="Flowchart: Alternate Process 2">
+            <a:extLst>
+              <a:ext uri="{FF2B5EF4-FFF2-40B4-BE49-F238E27FC236}">
+                <a16:creationId xmlns:a16="http://schemas.microsoft.com/office/drawing/2014/main" id="{3AE42388-A62D-39ED-FC8B-6D7C563BB5F6}"/>
+              </a:ext>
+            </a:extLst>
+          </p:cNvPr>
+          <p:cNvSpPr/>
+          <p:nvPr/>
+        </p:nvSpPr>
+        <p:spPr>
+          <a:xfrm>
+            <a:off x="4380449" y="302698"/>
+            <a:ext cx="1973843" cy="612648"/>
+          </a:xfrm>
+          <a:prstGeom prst="flowChartAlternateProcess">
+            <a:avLst/>
+          </a:prstGeom>
+          <a:noFill/>
+        </p:spPr>
+        <p:style>
+          <a:lnRef idx="2">
+            <a:schemeClr val="accent1">
+              <a:shade val="15000"/>
+            </a:schemeClr>
+          </a:lnRef>
+          <a:fillRef idx="1">
+            <a:schemeClr val="accent1"/>
+          </a:fillRef>
+          <a:effectRef idx="0">
+            <a:schemeClr val="accent1"/>
+          </a:effectRef>
+          <a:fontRef idx="minor">
+            <a:schemeClr val="lt1"/>
+          </a:fontRef>
+        </p:style>
+        <p:txBody>
+          <a:bodyPr rtlCol="0" anchor="ctr"/>
+          <a:lstStyle/>
+          <a:p>
+            <a:pPr algn="ctr"/>
+            <a:endParaRPr lang="en-US"/>
+          </a:p>
+        </p:txBody>
+      </p:sp>
+      <p:sp>
+        <p:nvSpPr>
+          <p:cNvPr id="4" name="TextBox 3">
+            <a:extLst>
+              <a:ext uri="{FF2B5EF4-FFF2-40B4-BE49-F238E27FC236}">
+                <a16:creationId xmlns:a16="http://schemas.microsoft.com/office/drawing/2014/main" id="{C82700E8-FB0A-407C-57D6-34AD93C55EC3}"/>
+              </a:ext>
+            </a:extLst>
+          </p:cNvPr>
+          <p:cNvSpPr txBox="1"/>
+          <p:nvPr/>
+        </p:nvSpPr>
+        <p:spPr>
+          <a:xfrm>
+            <a:off x="5001610" y="424356"/>
+            <a:ext cx="731520" cy="369332"/>
+          </a:xfrm>
+          <a:prstGeom prst="rect">
+            <a:avLst/>
+          </a:prstGeom>
+          <a:noFill/>
+        </p:spPr>
+        <p:txBody>
+          <a:bodyPr wrap="square" rtlCol="0">
+            <a:spAutoFit/>
+          </a:bodyPr>
+          <a:lstStyle/>
+          <a:p>
+            <a:r>
+              <a:rPr lang="en-US" dirty="0"/>
+              <a:t>main</a:t>
+            </a:r>
+          </a:p>
+        </p:txBody>
+      </p:sp>
+      <p:sp>
+        <p:nvSpPr>
+          <p:cNvPr id="5" name="Flowchart: Alternate Process 4">
+            <a:extLst>
+              <a:ext uri="{FF2B5EF4-FFF2-40B4-BE49-F238E27FC236}">
+                <a16:creationId xmlns:a16="http://schemas.microsoft.com/office/drawing/2014/main" id="{EA984AF8-0C95-D754-7073-B3BDBE38C9CF}"/>
+              </a:ext>
+            </a:extLst>
+          </p:cNvPr>
+          <p:cNvSpPr/>
+          <p:nvPr/>
+        </p:nvSpPr>
+        <p:spPr>
+          <a:xfrm>
+            <a:off x="6494079" y="1842516"/>
+            <a:ext cx="3196196" cy="2010576"/>
+          </a:xfrm>
+          <a:prstGeom prst="flowChartAlternateProcess">
+            <a:avLst/>
+          </a:prstGeom>
+          <a:noFill/>
+        </p:spPr>
+        <p:style>
+          <a:lnRef idx="2">
+            <a:schemeClr val="accent1">
+              <a:shade val="15000"/>
+            </a:schemeClr>
+          </a:lnRef>
+          <a:fillRef idx="1">
+            <a:schemeClr val="accent1"/>
+          </a:fillRef>
+          <a:effectRef idx="0">
+            <a:schemeClr val="accent1"/>
+          </a:effectRef>
+          <a:fontRef idx="minor">
+            <a:schemeClr val="lt1"/>
+          </a:fontRef>
+        </p:style>
+        <p:txBody>
+          <a:bodyPr rtlCol="0" anchor="ctr"/>
+          <a:lstStyle/>
+          <a:p>
+            <a:pPr algn="ctr"/>
+            <a:endParaRPr lang="en-US"/>
+          </a:p>
+        </p:txBody>
+      </p:sp>
+      <p:cxnSp>
+        <p:nvCxnSpPr>
+          <p:cNvPr id="10" name="Connector: Elbow 9">
+            <a:extLst>
+              <a:ext uri="{FF2B5EF4-FFF2-40B4-BE49-F238E27FC236}">
+                <a16:creationId xmlns:a16="http://schemas.microsoft.com/office/drawing/2014/main" id="{3D3E397F-1FE6-4DF3-3C54-DDE9A5633C27}"/>
+              </a:ext>
+            </a:extLst>
+          </p:cNvPr>
+          <p:cNvCxnSpPr>
+            <a:cxnSpLocks/>
+            <a:stCxn id="3" idx="2"/>
+            <a:endCxn id="5" idx="0"/>
+          </p:cNvCxnSpPr>
+          <p:nvPr/>
+        </p:nvCxnSpPr>
+        <p:spPr>
+          <a:xfrm rot="16200000" flipH="1">
+            <a:off x="6266189" y="16528"/>
+            <a:ext cx="927170" cy="2724806"/>
+          </a:xfrm>
+          <a:prstGeom prst="bentConnector3">
+            <a:avLst/>
+          </a:prstGeom>
+          <a:ln>
+            <a:tailEnd type="triangle"/>
+          </a:ln>
+        </p:spPr>
+        <p:style>
+          <a:lnRef idx="2">
+            <a:schemeClr val="accent1"/>
+          </a:lnRef>
+          <a:fillRef idx="0">
+            <a:schemeClr val="accent1"/>
+          </a:fillRef>
+          <a:effectRef idx="1">
+            <a:schemeClr val="accent1"/>
+          </a:effectRef>
+          <a:fontRef idx="minor">
+            <a:schemeClr val="tx1"/>
+          </a:fontRef>
+        </p:style>
+      </p:cxnSp>
+      <p:sp>
+        <p:nvSpPr>
+          <p:cNvPr id="11" name="TextBox 10">
+            <a:extLst>
+              <a:ext uri="{FF2B5EF4-FFF2-40B4-BE49-F238E27FC236}">
+                <a16:creationId xmlns:a16="http://schemas.microsoft.com/office/drawing/2014/main" id="{DB91C33A-677A-848F-0544-E4230DBFC23A}"/>
+              </a:ext>
+            </a:extLst>
+          </p:cNvPr>
+          <p:cNvSpPr txBox="1"/>
+          <p:nvPr/>
+        </p:nvSpPr>
+        <p:spPr>
+          <a:xfrm>
+            <a:off x="6669602" y="1973843"/>
+            <a:ext cx="2724806" cy="646331"/>
+          </a:xfrm>
+          <a:prstGeom prst="rect">
+            <a:avLst/>
+          </a:prstGeom>
+          <a:noFill/>
+        </p:spPr>
+        <p:txBody>
+          <a:bodyPr wrap="square" rtlCol="0">
+            <a:spAutoFit/>
+          </a:bodyPr>
+          <a:lstStyle/>
+          <a:p>
+            <a:r>
+              <a:rPr lang="en-US" dirty="0" err="1"/>
+              <a:t>Handle_Inputdata</a:t>
+            </a:r>
+            <a:endParaRPr lang="en-US" dirty="0"/>
+          </a:p>
+          <a:p>
+            <a:r>
+              <a:rPr lang="en-US" dirty="0"/>
+              <a:t>- Get primary UAV data</a:t>
+            </a:r>
+          </a:p>
+        </p:txBody>
+      </p:sp>
+      <p:sp>
+        <p:nvSpPr>
+          <p:cNvPr id="13" name="Flowchart: Alternate Process 12">
+            <a:extLst>
+              <a:ext uri="{FF2B5EF4-FFF2-40B4-BE49-F238E27FC236}">
+                <a16:creationId xmlns:a16="http://schemas.microsoft.com/office/drawing/2014/main" id="{A32B9522-FDDA-208A-B14D-F182CA70329B}"/>
+              </a:ext>
+            </a:extLst>
+          </p:cNvPr>
+          <p:cNvSpPr/>
+          <p:nvPr/>
+        </p:nvSpPr>
+        <p:spPr>
+          <a:xfrm>
+            <a:off x="510541" y="1973843"/>
+            <a:ext cx="4856830" cy="3361208"/>
+          </a:xfrm>
+          <a:prstGeom prst="flowChartAlternateProcess">
+            <a:avLst/>
+          </a:prstGeom>
+          <a:noFill/>
+        </p:spPr>
+        <p:style>
+          <a:lnRef idx="2">
+            <a:schemeClr val="accent1">
+              <a:shade val="15000"/>
+            </a:schemeClr>
+          </a:lnRef>
+          <a:fillRef idx="1">
+            <a:schemeClr val="accent1"/>
+          </a:fillRef>
+          <a:effectRef idx="0">
+            <a:schemeClr val="accent1"/>
+          </a:effectRef>
+          <a:fontRef idx="minor">
+            <a:schemeClr val="lt1"/>
+          </a:fontRef>
+        </p:style>
+        <p:txBody>
+          <a:bodyPr rtlCol="0" anchor="ctr"/>
+          <a:lstStyle/>
+          <a:p>
+            <a:pPr algn="ctr"/>
+            <a:endParaRPr lang="en-US"/>
+          </a:p>
+        </p:txBody>
+      </p:sp>
+      <p:cxnSp>
+        <p:nvCxnSpPr>
+          <p:cNvPr id="15" name="Connector: Elbow 14">
+            <a:extLst>
+              <a:ext uri="{FF2B5EF4-FFF2-40B4-BE49-F238E27FC236}">
+                <a16:creationId xmlns:a16="http://schemas.microsoft.com/office/drawing/2014/main" id="{ED73A23F-5B50-CC7C-1D29-0A4F3341FBAF}"/>
+              </a:ext>
+            </a:extLst>
+          </p:cNvPr>
+          <p:cNvCxnSpPr>
+            <a:cxnSpLocks/>
+            <a:stCxn id="3" idx="2"/>
+            <a:endCxn id="13" idx="0"/>
+          </p:cNvCxnSpPr>
+          <p:nvPr/>
+        </p:nvCxnSpPr>
+        <p:spPr>
+          <a:xfrm rot="5400000">
+            <a:off x="3623916" y="230387"/>
+            <a:ext cx="1058497" cy="2428415"/>
+          </a:xfrm>
+          <a:prstGeom prst="bentConnector3">
+            <a:avLst>
+              <a:gd name="adj1" fmla="val 50000"/>
+            </a:avLst>
+          </a:prstGeom>
+          <a:ln>
+            <a:tailEnd type="triangle"/>
+          </a:ln>
+        </p:spPr>
+        <p:style>
+          <a:lnRef idx="2">
+            <a:schemeClr val="accent1"/>
+          </a:lnRef>
+          <a:fillRef idx="0">
+            <a:schemeClr val="accent1"/>
+          </a:fillRef>
+          <a:effectRef idx="1">
+            <a:schemeClr val="accent1"/>
+          </a:effectRef>
+          <a:fontRef idx="minor">
+            <a:schemeClr val="tx1"/>
+          </a:fontRef>
+        </p:style>
+      </p:cxnSp>
+      <p:sp>
+        <p:nvSpPr>
+          <p:cNvPr id="17" name="TextBox 16">
+            <a:extLst>
+              <a:ext uri="{FF2B5EF4-FFF2-40B4-BE49-F238E27FC236}">
+                <a16:creationId xmlns:a16="http://schemas.microsoft.com/office/drawing/2014/main" id="{550AF697-C39F-BA79-CC09-181A34963BC6}"/>
+              </a:ext>
+            </a:extLst>
+          </p:cNvPr>
+          <p:cNvSpPr txBox="1"/>
+          <p:nvPr/>
+        </p:nvSpPr>
+        <p:spPr>
+          <a:xfrm>
+            <a:off x="709710" y="2155604"/>
+            <a:ext cx="4509989" cy="2923877"/>
+          </a:xfrm>
+          <a:prstGeom prst="rect">
+            <a:avLst/>
+          </a:prstGeom>
+          <a:noFill/>
+        </p:spPr>
+        <p:txBody>
+          <a:bodyPr wrap="square" rtlCol="0">
+            <a:spAutoFit/>
+          </a:bodyPr>
+          <a:lstStyle/>
+          <a:p>
+            <a:r>
+              <a:rPr lang="en-US" sz="1400" dirty="0" err="1"/>
+              <a:t>Handle_collission</a:t>
+            </a:r>
+            <a:endParaRPr lang="en-US" sz="1400" dirty="0"/>
+          </a:p>
+          <a:p>
+            <a:pPr marL="285750" indent="-285750">
+              <a:buFontTx/>
+              <a:buChar char="-"/>
+            </a:pPr>
+            <a:r>
+              <a:rPr lang="en-US" sz="1400" dirty="0" err="1"/>
+              <a:t>Detect_collision</a:t>
+            </a:r>
+            <a:endParaRPr lang="en-US" sz="1400" dirty="0"/>
+          </a:p>
+          <a:p>
+            <a:pPr marL="742950" lvl="1" indent="-285750">
+              <a:buFontTx/>
+              <a:buChar char="-"/>
+            </a:pPr>
+            <a:r>
+              <a:rPr lang="en-US" sz="1200" dirty="0"/>
+              <a:t>Compare time window of primary UAV and Simulation UAV </a:t>
+            </a:r>
+          </a:p>
+          <a:p>
+            <a:pPr marL="742950" lvl="1" indent="-285750">
+              <a:buFontTx/>
+              <a:buChar char="-"/>
+            </a:pPr>
+            <a:r>
+              <a:rPr lang="en-US" sz="1200" dirty="0"/>
+              <a:t>If time window conflicts</a:t>
+            </a:r>
+          </a:p>
+          <a:p>
+            <a:pPr marL="1200150" lvl="2" indent="-285750">
+              <a:buFontTx/>
+              <a:buChar char="-"/>
+            </a:pPr>
+            <a:r>
+              <a:rPr lang="en-US" sz="1200" dirty="0"/>
+              <a:t>Check if distance b/w primary and simulation UAV more than configured </a:t>
+            </a:r>
+            <a:r>
+              <a:rPr lang="en-US" sz="1200" dirty="0" err="1"/>
+              <a:t>safeDistance</a:t>
+            </a:r>
+            <a:endParaRPr lang="en-US" sz="1200" dirty="0"/>
+          </a:p>
+          <a:p>
+            <a:pPr marL="1657350" lvl="3" indent="-285750">
+              <a:buFontTx/>
+              <a:buChar char="-"/>
+            </a:pPr>
+            <a:r>
+              <a:rPr lang="en-US" sz="1200" dirty="0"/>
+              <a:t>If distance b/w both UAVs less than </a:t>
+            </a:r>
+            <a:r>
+              <a:rPr lang="en-US" sz="1200" dirty="0" err="1"/>
+              <a:t>safeDistance</a:t>
+            </a:r>
+            <a:r>
+              <a:rPr lang="en-US" sz="1200" dirty="0"/>
+              <a:t>, </a:t>
+            </a:r>
+          </a:p>
+          <a:p>
+            <a:pPr marL="2114550" lvl="4" indent="-285750">
+              <a:buFontTx/>
+              <a:buChar char="-"/>
+            </a:pPr>
+            <a:r>
+              <a:rPr lang="en-US" sz="1200" dirty="0"/>
+              <a:t>mark collision detection flag.</a:t>
+            </a:r>
+          </a:p>
+          <a:p>
+            <a:pPr marL="2114550" lvl="4" indent="-285750">
+              <a:buFontTx/>
+              <a:buChar char="-"/>
+            </a:pPr>
+            <a:r>
+              <a:rPr lang="en-US" sz="1200" dirty="0"/>
+              <a:t>Print collision info</a:t>
+            </a:r>
+          </a:p>
+          <a:p>
+            <a:pPr marL="2114550" lvl="4" indent="-285750">
+              <a:buFontTx/>
+              <a:buChar char="-"/>
+            </a:pPr>
+            <a:r>
+              <a:rPr lang="en-US" sz="1200" dirty="0"/>
+              <a:t>Print UAV info</a:t>
+            </a:r>
+          </a:p>
+          <a:p>
+            <a:pPr marL="1657350" lvl="3" indent="-285750">
+              <a:buFontTx/>
+              <a:buChar char="-"/>
+            </a:pPr>
+            <a:endParaRPr lang="en-US" sz="1200" dirty="0"/>
+          </a:p>
+          <a:p>
+            <a:pPr marL="3943350" lvl="8" indent="-285750">
+              <a:buFontTx/>
+              <a:buChar char="-"/>
+            </a:pPr>
+            <a:endParaRPr lang="en-US" sz="1200" dirty="0"/>
+          </a:p>
+          <a:p>
+            <a:pPr marL="1657350" lvl="3" indent="-285750">
+              <a:buFontTx/>
+              <a:buChar char="-"/>
+            </a:pPr>
+            <a:r>
+              <a:rPr lang="en-US" sz="1200" dirty="0"/>
+              <a:t>Plot all UAVs path</a:t>
+            </a:r>
+          </a:p>
+        </p:txBody>
+      </p:sp>
+      <p:sp>
+        <p:nvSpPr>
+          <p:cNvPr id="18" name="TextBox 17">
+            <a:extLst>
+              <a:ext uri="{FF2B5EF4-FFF2-40B4-BE49-F238E27FC236}">
+                <a16:creationId xmlns:a16="http://schemas.microsoft.com/office/drawing/2014/main" id="{F0FCA785-2166-9957-2E2C-11D932EAD6B9}"/>
+              </a:ext>
+            </a:extLst>
+          </p:cNvPr>
+          <p:cNvSpPr txBox="1"/>
+          <p:nvPr/>
+        </p:nvSpPr>
+        <p:spPr>
+          <a:xfrm>
+            <a:off x="3127879" y="1021189"/>
+            <a:ext cx="1381059" cy="430887"/>
+          </a:xfrm>
+          <a:prstGeom prst="rect">
+            <a:avLst/>
+          </a:prstGeom>
+          <a:noFill/>
+        </p:spPr>
+        <p:txBody>
+          <a:bodyPr wrap="square" rtlCol="0">
+            <a:spAutoFit/>
+          </a:bodyPr>
+          <a:lstStyle/>
+          <a:p>
+            <a:r>
+              <a:rPr lang="en-US" sz="1100" dirty="0"/>
+              <a:t>Pass primary UAV data</a:t>
+            </a:r>
+          </a:p>
+        </p:txBody>
+      </p:sp>
+    </p:spTree>
+    <p:extLst>
+      <p:ext uri="{BB962C8B-B14F-4D97-AF65-F5344CB8AC3E}">
+        <p14:creationId xmlns:p14="http://schemas.microsoft.com/office/powerpoint/2010/main" val="1021426325"/>
+      </p:ext>
+    </p:extLst>
+  </p:cSld>
+  <p:clrMapOvr>
+    <a:masterClrMapping/>
+  </p:clrMapOvr>
+</p:sld>
+</file>
+
+<file path=ppt/slides/slide4.xml><?xml version="1.0" encoding="utf-8"?>
 <p:sld xmlns:a="http://schemas.openxmlformats.org/drawingml/2006/main" xmlns:r="http://schemas.openxmlformats.org/officeDocument/2006/relationships" xmlns:p="http://schemas.openxmlformats.org/presentationml/2006/main">
   <p:cSld>
     <p:spTree>

</xml_diff>